<commit_message>
Joy Global Presentation Submission
This presentation now includes my electrical points
</commit_message>
<xml_diff>
--- a/Documentation/Presentation/Joy Global Presentation.pptx
+++ b/Documentation/Presentation/Joy Global Presentation.pptx
@@ -15,11 +15,14 @@
     <p:sldId id="299" r:id="rId9"/>
     <p:sldId id="300" r:id="rId10"/>
     <p:sldId id="301" r:id="rId11"/>
-    <p:sldId id="302" r:id="rId12"/>
-    <p:sldId id="303" r:id="rId13"/>
-    <p:sldId id="304" r:id="rId14"/>
-    <p:sldId id="295" r:id="rId15"/>
-    <p:sldId id="263" r:id="rId16"/>
+    <p:sldId id="306" r:id="rId12"/>
+    <p:sldId id="307" r:id="rId13"/>
+    <p:sldId id="305" r:id="rId14"/>
+    <p:sldId id="302" r:id="rId15"/>
+    <p:sldId id="303" r:id="rId16"/>
+    <p:sldId id="304" r:id="rId17"/>
+    <p:sldId id="295" r:id="rId18"/>
+    <p:sldId id="263" r:id="rId19"/>
   </p:sldIdLst>
   <p:sldSz cx="12192000" cy="6858000"/>
   <p:notesSz cx="6858000" cy="9144000"/>
@@ -12430,13 +12433,8 @@
           <a:p>
             <a:r>
               <a:rPr lang="en-US" dirty="0" smtClean="0"/>
-              <a:t>Tyler Paddock – </a:t>
-            </a:r>
-            <a:r>
-              <a:rPr lang="en-US" dirty="0" smtClean="0"/>
-              <a:t>CE</a:t>
-            </a:r>
-            <a:endParaRPr lang="en-US" dirty="0" smtClean="0"/>
+              <a:t>Tyler Paddock – CE</a:t>
+            </a:r>
           </a:p>
           <a:p>
             <a:r>
@@ -12692,7 +12690,12 @@
             <p:ph type="title"/>
           </p:nvPr>
         </p:nvSpPr>
-        <p:spPr/>
+        <p:spPr>
+          <a:xfrm>
+            <a:off x="1141413" y="230329"/>
+            <a:ext cx="9905998" cy="1478570"/>
+          </a:xfrm>
+        </p:spPr>
         <p:txBody>
           <a:bodyPr/>
           <a:lstStyle/>
@@ -12715,9 +12718,16 @@
             <p:ph idx="1"/>
           </p:nvPr>
         </p:nvSpPr>
-        <p:spPr/>
+        <p:spPr>
+          <a:xfrm>
+            <a:off x="1141413" y="1473110"/>
+            <a:ext cx="9905999" cy="5048460"/>
+          </a:xfrm>
+        </p:spPr>
         <p:txBody>
-          <a:bodyPr/>
+          <a:bodyPr>
+            <a:normAutofit/>
+          </a:bodyPr>
           <a:lstStyle/>
           <a:p>
             <a:r>
@@ -12728,32 +12738,91 @@
           <a:p>
             <a:r>
               <a:rPr lang="en-US" dirty="0" smtClean="0"/>
-              <a:t>Amplifier requires +- 10v rails from battery source</a:t>
-            </a:r>
-          </a:p>
-          <a:p>
+              <a:t>Amplifier requires </a:t>
+            </a:r>
             <a:r>
               <a:rPr lang="en-US" dirty="0" smtClean="0"/>
-              <a:t>Feedback is a Linear Resistive Transducer in range (0, Vin)</a:t>
+              <a:t>+ and – negative rails to perform signal conditioning</a:t>
             </a:r>
           </a:p>
           <a:p>
             <a:r>
               <a:rPr lang="en-US" dirty="0" smtClean="0"/>
-              <a:t>9v power supply to Arduino microcontroller</a:t>
-            </a:r>
+              <a:t>Switch Capacitor Voltage Converter circuit provides negative rail</a:t>
+            </a:r>
+            <a:endParaRPr lang="en-US" dirty="0" smtClean="0"/>
           </a:p>
           <a:p>
             <a:r>
               <a:rPr lang="en-US" dirty="0" smtClean="0"/>
-              <a:t>Debug panel design and fabrication</a:t>
-            </a:r>
+              <a:t>Cylinder Position Feedback </a:t>
+            </a:r>
+            <a:r>
+              <a:rPr lang="en-US" dirty="0" smtClean="0"/>
+              <a:t>is a Linear Resistive </a:t>
+            </a:r>
+            <a:r>
+              <a:rPr lang="en-US" dirty="0" smtClean="0"/>
+              <a:t>Transducer</a:t>
+            </a:r>
+          </a:p>
+          <a:p>
+            <a:r>
+              <a:rPr lang="en-US" dirty="0" smtClean="0"/>
+              <a:t>9v </a:t>
+            </a:r>
+            <a:r>
+              <a:rPr lang="en-US" dirty="0" smtClean="0"/>
+              <a:t>power supply to Arduino </a:t>
+            </a:r>
+            <a:r>
+              <a:rPr lang="en-US" dirty="0" smtClean="0"/>
+              <a:t>Mega and 30 volt supply for the valves</a:t>
+            </a:r>
+            <a:endParaRPr lang="en-US" dirty="0" smtClean="0"/>
+          </a:p>
+          <a:p>
+            <a:r>
+              <a:rPr lang="en-US" dirty="0" smtClean="0"/>
+              <a:t>Debug panel </a:t>
+            </a:r>
+            <a:endParaRPr lang="en-US" dirty="0" smtClean="0"/>
           </a:p>
           <a:p>
             <a:pPr lvl="1"/>
             <a:r>
               <a:rPr lang="en-US" dirty="0" smtClean="0"/>
-              <a:t>Battery indicator LEDs, banana plugs for signal debugging</a:t>
+              <a:t>Battery </a:t>
+            </a:r>
+            <a:r>
+              <a:rPr lang="en-US" dirty="0" smtClean="0"/>
+              <a:t>indicator </a:t>
+            </a:r>
+            <a:r>
+              <a:rPr lang="en-US" dirty="0" smtClean="0"/>
+              <a:t>LEDs</a:t>
+            </a:r>
+          </a:p>
+          <a:p>
+            <a:pPr lvl="1"/>
+            <a:r>
+              <a:rPr lang="en-US" dirty="0" smtClean="0"/>
+              <a:t>Banana </a:t>
+            </a:r>
+            <a:r>
+              <a:rPr lang="en-US" dirty="0" smtClean="0"/>
+              <a:t>plugs </a:t>
+            </a:r>
+            <a:r>
+              <a:rPr lang="en-US" dirty="0" smtClean="0"/>
+              <a:t>for compatibility with MSOE lab equipment</a:t>
+            </a:r>
+          </a:p>
+          <a:p>
+            <a:pPr lvl="1"/>
+            <a:r>
+              <a:rPr lang="en-US" dirty="0" smtClean="0"/>
+              <a:t>Emergency Stop</a:t>
             </a:r>
             <a:endParaRPr lang="en-US" dirty="0"/>
           </a:p>
@@ -12806,37 +12875,86 @@
             <p:ph type="title"/>
           </p:nvPr>
         </p:nvSpPr>
-        <p:spPr/>
+        <p:spPr>
+          <a:xfrm>
+            <a:off x="1175918" y="230329"/>
+            <a:ext cx="9905998" cy="1478570"/>
+          </a:xfrm>
+        </p:spPr>
         <p:txBody>
           <a:bodyPr/>
           <a:lstStyle/>
           <a:p>
             <a:r>
               <a:rPr lang="en-US" dirty="0" smtClean="0"/>
-              <a:t>Electrical system</a:t>
+              <a:t>Arduino Mega PWM to Analog</a:t>
             </a:r>
             <a:endParaRPr lang="en-US" dirty="0"/>
           </a:p>
         </p:txBody>
       </p:sp>
-      <p:sp>
-        <p:nvSpPr>
-          <p:cNvPr id="3" name="Content Placeholder 2"/>
-          <p:cNvSpPr>
-            <a:spLocks noGrp="1"/>
-          </p:cNvSpPr>
+      <p:pic>
+        <p:nvPicPr>
+          <p:cNvPr id="4" name="Content Placeholder 3"/>
+          <p:cNvPicPr>
+            <a:picLocks noGrp="1" noChangeAspect="1"/>
+          </p:cNvPicPr>
           <p:nvPr>
             <p:ph idx="1"/>
           </p:nvPr>
+        </p:nvPicPr>
+        <p:blipFill>
+          <a:blip r:embed="rId2">
+            <a:extLst>
+              <a:ext uri="{28A0092B-C50C-407E-A947-70E740481C1C}">
+                <a14:useLocalDpi xmlns:a14="http://schemas.microsoft.com/office/drawing/2010/main" val="0"/>
+              </a:ext>
+            </a:extLst>
+          </a:blip>
+          <a:stretch>
+            <a:fillRect/>
+          </a:stretch>
+        </p:blipFill>
+        <p:spPr>
+          <a:xfrm>
+            <a:off x="838143" y="1602506"/>
+            <a:ext cx="10412248" cy="4306588"/>
+          </a:xfrm>
+        </p:spPr>
+      </p:pic>
+      <p:sp>
+        <p:nvSpPr>
+          <p:cNvPr id="5" name="TextBox 4"/>
+          <p:cNvSpPr txBox="1"/>
+          <p:nvPr/>
         </p:nvSpPr>
-        <p:spPr/>
+        <p:spPr>
+          <a:xfrm>
+            <a:off x="4028537" y="6055743"/>
+            <a:ext cx="3950898" cy="369332"/>
+          </a:xfrm>
+          <a:prstGeom prst="rect">
+            <a:avLst/>
+          </a:prstGeom>
+          <a:noFill/>
+        </p:spPr>
         <p:txBody>
-          <a:bodyPr/>
+          <a:bodyPr wrap="square" rtlCol="0">
+            <a:spAutoFit/>
+          </a:bodyPr>
           <a:lstStyle/>
           <a:p>
             <a:r>
               <a:rPr lang="en-US" dirty="0" smtClean="0"/>
-              <a:t>Insert diagrams and images</a:t>
+              <a:t>Third Order </a:t>
+            </a:r>
+            <a:r>
+              <a:rPr lang="en-US" dirty="0" err="1" smtClean="0"/>
+              <a:t>Sallen</a:t>
+            </a:r>
+            <a:r>
+              <a:rPr lang="en-US" dirty="0" smtClean="0"/>
+              <a:t>-Key Low Pass Filter</a:t>
             </a:r>
             <a:endParaRPr lang="en-US" dirty="0"/>
           </a:p>
@@ -12845,7 +12963,7 @@
     </p:spTree>
     <p:extLst>
       <p:ext uri="{BB962C8B-B14F-4D97-AF65-F5344CB8AC3E}">
-        <p14:creationId xmlns:p14="http://schemas.microsoft.com/office/powerpoint/2010/main" val="1452684072"/>
+        <p14:creationId xmlns:p14="http://schemas.microsoft.com/office/powerpoint/2010/main" val="3603989496"/>
       </p:ext>
     </p:extLst>
   </p:cSld>
@@ -12889,80 +13007,100 @@
             <p:ph type="title"/>
           </p:nvPr>
         </p:nvSpPr>
-        <p:spPr/>
+        <p:spPr>
+          <a:xfrm>
+            <a:off x="1219051" y="0"/>
+            <a:ext cx="9905998" cy="1478570"/>
+          </a:xfrm>
+        </p:spPr>
         <p:txBody>
           <a:bodyPr/>
           <a:lstStyle/>
           <a:p>
             <a:r>
               <a:rPr lang="en-US" dirty="0" smtClean="0"/>
-              <a:t>Control scheme</a:t>
+              <a:t>Filter Response</a:t>
             </a:r>
             <a:endParaRPr lang="en-US" dirty="0"/>
           </a:p>
         </p:txBody>
       </p:sp>
-      <p:sp>
-        <p:nvSpPr>
-          <p:cNvPr id="3" name="Content Placeholder 2"/>
-          <p:cNvSpPr>
-            <a:spLocks noGrp="1"/>
-          </p:cNvSpPr>
+      <p:pic>
+        <p:nvPicPr>
+          <p:cNvPr id="4" name="Content Placeholder 3"/>
+          <p:cNvPicPr>
+            <a:picLocks noGrp="1" noChangeAspect="1"/>
+          </p:cNvPicPr>
           <p:nvPr>
             <p:ph idx="1"/>
           </p:nvPr>
+        </p:nvPicPr>
+        <p:blipFill>
+          <a:blip r:embed="rId2">
+            <a:extLst>
+              <a:ext uri="{28A0092B-C50C-407E-A947-70E740481C1C}">
+                <a14:useLocalDpi xmlns:a14="http://schemas.microsoft.com/office/drawing/2010/main" val="0"/>
+              </a:ext>
+            </a:extLst>
+          </a:blip>
+          <a:stretch>
+            <a:fillRect/>
+          </a:stretch>
+        </p:blipFill>
+        <p:spPr>
+          <a:xfrm>
+            <a:off x="4591900" y="1007283"/>
+            <a:ext cx="6631066" cy="5597783"/>
+          </a:xfrm>
+        </p:spPr>
+      </p:pic>
+      <p:sp>
+        <p:nvSpPr>
+          <p:cNvPr id="5" name="TextBox 4"/>
+          <p:cNvSpPr txBox="1"/>
+          <p:nvPr/>
         </p:nvSpPr>
-        <p:spPr/>
+        <p:spPr>
+          <a:xfrm>
+            <a:off x="983412" y="1889184"/>
+            <a:ext cx="3088256" cy="1754326"/>
+          </a:xfrm>
+          <a:prstGeom prst="rect">
+            <a:avLst/>
+          </a:prstGeom>
+          <a:noFill/>
+        </p:spPr>
         <p:txBody>
-          <a:bodyPr/>
+          <a:bodyPr wrap="square" rtlCol="0">
+            <a:spAutoFit/>
+          </a:bodyPr>
           <a:lstStyle/>
           <a:p>
+            <a:pPr marL="285750" indent="-285750">
+              <a:buFont typeface="Arial" panose="020B0604020202020204" pitchFamily="34" charset="0"/>
+              <a:buChar char="•"/>
+            </a:pPr>
             <a:r>
               <a:rPr lang="en-US" dirty="0" smtClean="0"/>
-              <a:t>Controlled via Simulink model compiled to microcontroller</a:t>
-            </a:r>
-          </a:p>
-          <a:p>
+              <a:t>Higher order filter was used to get a smooth response</a:t>
+            </a:r>
+          </a:p>
+          <a:p>
+            <a:pPr marL="285750" indent="-285750">
+              <a:buFont typeface="Arial" panose="020B0604020202020204" pitchFamily="34" charset="0"/>
+              <a:buChar char="•"/>
+            </a:pPr>
+            <a:endParaRPr lang="en-US" dirty="0"/>
+          </a:p>
+          <a:p>
+            <a:pPr marL="285750" indent="-285750">
+              <a:buFont typeface="Arial" panose="020B0604020202020204" pitchFamily="34" charset="0"/>
+              <a:buChar char="•"/>
+            </a:pPr>
             <a:r>
               <a:rPr lang="en-US" dirty="0" smtClean="0"/>
-              <a:t>Simulink uses a </a:t>
-            </a:r>
-            <a:r>
-              <a:rPr lang="en-US" dirty="0" err="1" smtClean="0"/>
-              <a:t>Stateflow</a:t>
-            </a:r>
-            <a:r>
-              <a:rPr lang="en-US" dirty="0" smtClean="0"/>
-              <a:t> diagram to control foot position based on user input</a:t>
-            </a:r>
-          </a:p>
-          <a:p>
-            <a:r>
-              <a:rPr lang="en-US" dirty="0" smtClean="0"/>
-              <a:t>User controls microcontroller via joystick with a custom java HMI through a wireless </a:t>
-            </a:r>
-            <a:r>
-              <a:rPr lang="en-US" dirty="0" err="1" smtClean="0"/>
-              <a:t>zigbee</a:t>
-            </a:r>
-            <a:r>
-              <a:rPr lang="en-US" dirty="0" smtClean="0"/>
-              <a:t> communicator</a:t>
-            </a:r>
-          </a:p>
-          <a:p>
-            <a:r>
-              <a:rPr lang="en-US" dirty="0" smtClean="0"/>
-              <a:t>Currently uses a lookup table with index to determine next foot position</a:t>
-            </a:r>
-          </a:p>
-          <a:p>
-            <a:r>
-              <a:rPr lang="en-US" dirty="0" smtClean="0"/>
-              <a:t>Delays next command until current is within a threshold</a:t>
-            </a:r>
-          </a:p>
-          <a:p>
+              <a:t>Third order filter was selected to maintain fabrication simplicity</a:t>
+            </a:r>
             <a:endParaRPr lang="en-US" dirty="0"/>
           </a:p>
         </p:txBody>
@@ -12970,7 +13108,7 @@
     </p:spTree>
     <p:extLst>
       <p:ext uri="{BB962C8B-B14F-4D97-AF65-F5344CB8AC3E}">
-        <p14:creationId xmlns:p14="http://schemas.microsoft.com/office/powerpoint/2010/main" val="1487975679"/>
+        <p14:creationId xmlns:p14="http://schemas.microsoft.com/office/powerpoint/2010/main" val="3715232091"/>
       </p:ext>
     </p:extLst>
   </p:cSld>
@@ -13014,38 +13152,121 @@
             <p:ph type="title"/>
           </p:nvPr>
         </p:nvSpPr>
-        <p:spPr/>
+        <p:spPr>
+          <a:xfrm>
+            <a:off x="1141413" y="83681"/>
+            <a:ext cx="9905998" cy="1478570"/>
+          </a:xfrm>
+        </p:spPr>
         <p:txBody>
           <a:bodyPr/>
           <a:lstStyle/>
           <a:p>
             <a:r>
               <a:rPr lang="en-US" dirty="0" smtClean="0"/>
-              <a:t>Control scheme</a:t>
+              <a:t>Debug Panel Layout</a:t>
             </a:r>
             <a:endParaRPr lang="en-US" dirty="0"/>
           </a:p>
         </p:txBody>
       </p:sp>
-      <p:sp>
-        <p:nvSpPr>
-          <p:cNvPr id="3" name="Content Placeholder 2"/>
-          <p:cNvSpPr>
-            <a:spLocks noGrp="1"/>
-          </p:cNvSpPr>
+      <p:pic>
+        <p:nvPicPr>
+          <p:cNvPr id="4" name="Content Placeholder 3"/>
+          <p:cNvPicPr>
+            <a:picLocks noGrp="1" noChangeAspect="1"/>
+          </p:cNvPicPr>
           <p:nvPr>
             <p:ph idx="1"/>
           </p:nvPr>
+        </p:nvPicPr>
+        <p:blipFill>
+          <a:blip r:embed="rId2">
+            <a:extLst>
+              <a:ext uri="{28A0092B-C50C-407E-A947-70E740481C1C}">
+                <a14:useLocalDpi xmlns:a14="http://schemas.microsoft.com/office/drawing/2010/main" val="0"/>
+              </a:ext>
+            </a:extLst>
+          </a:blip>
+          <a:stretch>
+            <a:fillRect/>
+          </a:stretch>
+        </p:blipFill>
+        <p:spPr>
+          <a:xfrm>
+            <a:off x="5037826" y="1742537"/>
+            <a:ext cx="6772174" cy="4563718"/>
+          </a:xfrm>
+        </p:spPr>
+      </p:pic>
+      <p:sp>
+        <p:nvSpPr>
+          <p:cNvPr id="5" name="TextBox 4"/>
+          <p:cNvSpPr txBox="1"/>
+          <p:nvPr/>
         </p:nvSpPr>
-        <p:spPr/>
+        <p:spPr>
+          <a:xfrm>
+            <a:off x="741871" y="1562251"/>
+            <a:ext cx="4295955" cy="3693319"/>
+          </a:xfrm>
+          <a:prstGeom prst="rect">
+            <a:avLst/>
+          </a:prstGeom>
+          <a:noFill/>
+        </p:spPr>
         <p:txBody>
-          <a:bodyPr/>
+          <a:bodyPr wrap="square" rtlCol="0">
+            <a:spAutoFit/>
+          </a:bodyPr>
           <a:lstStyle/>
           <a:p>
             <a:r>
               <a:rPr lang="en-US" dirty="0" smtClean="0"/>
-              <a:t>Insert diagrams here</a:t>
-            </a:r>
+              <a:t>USB Plug: Program with disassembly</a:t>
+            </a:r>
+          </a:p>
+          <a:p>
+            <a:endParaRPr lang="en-US" dirty="0"/>
+          </a:p>
+          <a:p>
+            <a:r>
+              <a:rPr lang="en-US" dirty="0" smtClean="0"/>
+              <a:t>Emergency Stop: Removes valve power</a:t>
+            </a:r>
+          </a:p>
+          <a:p>
+            <a:endParaRPr lang="en-US" dirty="0"/>
+          </a:p>
+          <a:p>
+            <a:r>
+              <a:rPr lang="en-US" dirty="0" smtClean="0"/>
+              <a:t>Banana Connections: Each leg’s control signal is accessible</a:t>
+            </a:r>
+          </a:p>
+          <a:p>
+            <a:endParaRPr lang="en-US" dirty="0"/>
+          </a:p>
+          <a:p>
+            <a:r>
+              <a:rPr lang="en-US" dirty="0" err="1" smtClean="0"/>
+              <a:t>Comms</a:t>
+            </a:r>
+            <a:r>
+              <a:rPr lang="en-US" dirty="0" smtClean="0"/>
+              <a:t>. Status LED: Indicate communication system connection</a:t>
+            </a:r>
+          </a:p>
+          <a:p>
+            <a:endParaRPr lang="en-US" dirty="0"/>
+          </a:p>
+          <a:p>
+            <a:r>
+              <a:rPr lang="en-US" dirty="0" smtClean="0"/>
+              <a:t>Status LED: Indicate status states in the software</a:t>
+            </a:r>
+          </a:p>
+          <a:p>
             <a:endParaRPr lang="en-US" dirty="0"/>
           </a:p>
         </p:txBody>
@@ -13053,7 +13274,7 @@
     </p:spTree>
     <p:extLst>
       <p:ext uri="{BB962C8B-B14F-4D97-AF65-F5344CB8AC3E}">
-        <p14:creationId xmlns:p14="http://schemas.microsoft.com/office/powerpoint/2010/main" val="2600624425"/>
+        <p14:creationId xmlns:p14="http://schemas.microsoft.com/office/powerpoint/2010/main" val="2374722845"/>
       </p:ext>
     </p:extLst>
   </p:cSld>
@@ -13104,6 +13325,413 @@
           <a:p>
             <a:r>
               <a:rPr lang="en-US" dirty="0" smtClean="0"/>
+              <a:t>Switched Capacitor Voltage Converter</a:t>
+            </a:r>
+            <a:endParaRPr lang="en-US" dirty="0"/>
+          </a:p>
+        </p:txBody>
+      </p:sp>
+      <p:pic>
+        <p:nvPicPr>
+          <p:cNvPr id="4" name="Content Placeholder 3"/>
+          <p:cNvPicPr>
+            <a:picLocks noGrp="1" noChangeAspect="1"/>
+          </p:cNvPicPr>
+          <p:nvPr>
+            <p:ph idx="1"/>
+          </p:nvPr>
+        </p:nvPicPr>
+        <p:blipFill>
+          <a:blip r:embed="rId2">
+            <a:extLst>
+              <a:ext uri="{28A0092B-C50C-407E-A947-70E740481C1C}">
+                <a14:useLocalDpi xmlns:a14="http://schemas.microsoft.com/office/drawing/2010/main" val="0"/>
+              </a:ext>
+            </a:extLst>
+          </a:blip>
+          <a:stretch>
+            <a:fillRect/>
+          </a:stretch>
+        </p:blipFill>
+        <p:spPr>
+          <a:xfrm>
+            <a:off x="5883215" y="1818166"/>
+            <a:ext cx="5617465" cy="4213099"/>
+          </a:xfrm>
+        </p:spPr>
+      </p:pic>
+      <p:sp>
+        <p:nvSpPr>
+          <p:cNvPr id="5" name="TextBox 4"/>
+          <p:cNvSpPr txBox="1"/>
+          <p:nvPr/>
+        </p:nvSpPr>
+        <p:spPr>
+          <a:xfrm>
+            <a:off x="992037" y="2079018"/>
+            <a:ext cx="4313208" cy="3970318"/>
+          </a:xfrm>
+          <a:prstGeom prst="rect">
+            <a:avLst/>
+          </a:prstGeom>
+          <a:noFill/>
+        </p:spPr>
+        <p:txBody>
+          <a:bodyPr wrap="square" rtlCol="0">
+            <a:spAutoFit/>
+          </a:bodyPr>
+          <a:lstStyle/>
+          <a:p>
+            <a:r>
+              <a:rPr lang="en-US" dirty="0" smtClean="0"/>
+              <a:t>Notice the breadboard style PCB board</a:t>
+            </a:r>
+          </a:p>
+          <a:p>
+            <a:endParaRPr lang="en-US" dirty="0"/>
+          </a:p>
+          <a:p>
+            <a:r>
+              <a:rPr lang="en-US" dirty="0" smtClean="0"/>
+              <a:t>Disadvantages:</a:t>
+            </a:r>
+          </a:p>
+          <a:p>
+            <a:pPr marL="285750" indent="-285750">
+              <a:buFont typeface="Arial" panose="020B0604020202020204" pitchFamily="34" charset="0"/>
+              <a:buChar char="•"/>
+            </a:pPr>
+            <a:r>
+              <a:rPr lang="en-US" dirty="0" smtClean="0"/>
+              <a:t>Soldering the connections</a:t>
+            </a:r>
+          </a:p>
+          <a:p>
+            <a:pPr marL="285750" indent="-285750">
+              <a:buFont typeface="Arial" panose="020B0604020202020204" pitchFamily="34" charset="0"/>
+              <a:buChar char="•"/>
+            </a:pPr>
+            <a:r>
+              <a:rPr lang="en-US" dirty="0" smtClean="0"/>
+              <a:t>Not as clean as a custom PCB board</a:t>
+            </a:r>
+            <a:endParaRPr lang="en-US" dirty="0"/>
+          </a:p>
+          <a:p>
+            <a:endParaRPr lang="en-US" dirty="0" smtClean="0"/>
+          </a:p>
+          <a:p>
+            <a:r>
+              <a:rPr lang="en-US" dirty="0" smtClean="0"/>
+              <a:t>Advantages:</a:t>
+            </a:r>
+          </a:p>
+          <a:p>
+            <a:pPr marL="285750" indent="-285750">
+              <a:buFont typeface="Arial" panose="020B0604020202020204" pitchFamily="34" charset="0"/>
+              <a:buChar char="•"/>
+            </a:pPr>
+            <a:r>
+              <a:rPr lang="en-US" dirty="0" smtClean="0"/>
+              <a:t>Modifications are possible for future teams</a:t>
+            </a:r>
+          </a:p>
+          <a:p>
+            <a:pPr marL="285750" indent="-285750">
+              <a:buFont typeface="Arial" panose="020B0604020202020204" pitchFamily="34" charset="0"/>
+              <a:buChar char="•"/>
+            </a:pPr>
+            <a:r>
+              <a:rPr lang="en-US" dirty="0" smtClean="0"/>
+              <a:t>More secure than breadboard prototyping</a:t>
+            </a:r>
+          </a:p>
+          <a:p>
+            <a:pPr marL="285750" indent="-285750">
+              <a:buFont typeface="Arial" panose="020B0604020202020204" pitchFamily="34" charset="0"/>
+              <a:buChar char="•"/>
+            </a:pPr>
+            <a:r>
+              <a:rPr lang="en-US" dirty="0" smtClean="0"/>
+              <a:t>Low cost (several dollars per board) vs, custom design runs</a:t>
+            </a:r>
+          </a:p>
+          <a:p>
+            <a:endParaRPr lang="en-US" dirty="0"/>
+          </a:p>
+        </p:txBody>
+      </p:sp>
+    </p:spTree>
+    <p:extLst>
+      <p:ext uri="{BB962C8B-B14F-4D97-AF65-F5344CB8AC3E}">
+        <p14:creationId xmlns:p14="http://schemas.microsoft.com/office/powerpoint/2010/main" val="1452684072"/>
+      </p:ext>
+    </p:extLst>
+  </p:cSld>
+  <p:clrMapOvr>
+    <a:masterClrMapping/>
+  </p:clrMapOvr>
+  <p:timing>
+    <p:tnLst>
+      <p:par>
+        <p:cTn id="1" dur="indefinite" restart="never" nodeType="tmRoot"/>
+      </p:par>
+    </p:tnLst>
+  </p:timing>
+</p:sld>
+</file>
+
+<file path=ppt/slides/slide15.xml><?xml version="1.0" encoding="utf-8"?>
+<p:sld xmlns:a="http://schemas.openxmlformats.org/drawingml/2006/main" xmlns:r="http://schemas.openxmlformats.org/officeDocument/2006/relationships" xmlns:p="http://schemas.openxmlformats.org/presentationml/2006/main">
+  <p:cSld>
+    <p:spTree>
+      <p:nvGrpSpPr>
+        <p:cNvPr id="1" name=""/>
+        <p:cNvGrpSpPr/>
+        <p:nvPr/>
+      </p:nvGrpSpPr>
+      <p:grpSpPr>
+        <a:xfrm>
+          <a:off x="0" y="0"/>
+          <a:ext cx="0" cy="0"/>
+          <a:chOff x="0" y="0"/>
+          <a:chExt cx="0" cy="0"/>
+        </a:xfrm>
+      </p:grpSpPr>
+      <p:sp>
+        <p:nvSpPr>
+          <p:cNvPr id="2" name="Title 1"/>
+          <p:cNvSpPr>
+            <a:spLocks noGrp="1"/>
+          </p:cNvSpPr>
+          <p:nvPr>
+            <p:ph type="title"/>
+          </p:nvPr>
+        </p:nvSpPr>
+        <p:spPr/>
+        <p:txBody>
+          <a:bodyPr/>
+          <a:lstStyle/>
+          <a:p>
+            <a:r>
+              <a:rPr lang="en-US" dirty="0" smtClean="0"/>
+              <a:t>Control scheme</a:t>
+            </a:r>
+            <a:endParaRPr lang="en-US" dirty="0"/>
+          </a:p>
+        </p:txBody>
+      </p:sp>
+      <p:sp>
+        <p:nvSpPr>
+          <p:cNvPr id="3" name="Content Placeholder 2"/>
+          <p:cNvSpPr>
+            <a:spLocks noGrp="1"/>
+          </p:cNvSpPr>
+          <p:nvPr>
+            <p:ph idx="1"/>
+          </p:nvPr>
+        </p:nvSpPr>
+        <p:spPr/>
+        <p:txBody>
+          <a:bodyPr/>
+          <a:lstStyle/>
+          <a:p>
+            <a:r>
+              <a:rPr lang="en-US" dirty="0" smtClean="0"/>
+              <a:t>Code generated from Simulink model</a:t>
+            </a:r>
+            <a:endParaRPr lang="en-US" dirty="0" smtClean="0"/>
+          </a:p>
+          <a:p>
+            <a:r>
+              <a:rPr lang="en-US" dirty="0" smtClean="0"/>
+              <a:t>Simulink uses a </a:t>
+            </a:r>
+            <a:r>
+              <a:rPr lang="en-US" dirty="0" err="1" smtClean="0"/>
+              <a:t>Stateflow</a:t>
+            </a:r>
+            <a:r>
+              <a:rPr lang="en-US" dirty="0" smtClean="0"/>
+              <a:t> diagram to control foot position based on user input</a:t>
+            </a:r>
+          </a:p>
+          <a:p>
+            <a:r>
+              <a:rPr lang="en-US" dirty="0" smtClean="0"/>
+              <a:t>User controls microcontroller via joystick with a custom java HMI through a wireless </a:t>
+            </a:r>
+            <a:r>
+              <a:rPr lang="en-US" dirty="0" err="1" smtClean="0"/>
+              <a:t>zigbee</a:t>
+            </a:r>
+            <a:r>
+              <a:rPr lang="en-US" dirty="0" smtClean="0"/>
+              <a:t> communicator</a:t>
+            </a:r>
+          </a:p>
+          <a:p>
+            <a:r>
+              <a:rPr lang="en-US" dirty="0" smtClean="0"/>
+              <a:t>Currently uses a lookup table with index to determine next foot position</a:t>
+            </a:r>
+          </a:p>
+          <a:p>
+            <a:r>
+              <a:rPr lang="en-US" dirty="0" smtClean="0"/>
+              <a:t>Delays next command until </a:t>
+            </a:r>
+            <a:r>
+              <a:rPr lang="en-US" dirty="0" smtClean="0"/>
+              <a:t>voltage </a:t>
+            </a:r>
+            <a:r>
+              <a:rPr lang="en-US" dirty="0" smtClean="0"/>
+              <a:t>is within a threshold</a:t>
+            </a:r>
+          </a:p>
+          <a:p>
+            <a:endParaRPr lang="en-US" dirty="0"/>
+          </a:p>
+        </p:txBody>
+      </p:sp>
+    </p:spTree>
+    <p:extLst>
+      <p:ext uri="{BB962C8B-B14F-4D97-AF65-F5344CB8AC3E}">
+        <p14:creationId xmlns:p14="http://schemas.microsoft.com/office/powerpoint/2010/main" val="1487975679"/>
+      </p:ext>
+    </p:extLst>
+  </p:cSld>
+  <p:clrMapOvr>
+    <a:masterClrMapping/>
+  </p:clrMapOvr>
+  <p:timing>
+    <p:tnLst>
+      <p:par>
+        <p:cTn id="1" dur="indefinite" restart="never" nodeType="tmRoot"/>
+      </p:par>
+    </p:tnLst>
+  </p:timing>
+</p:sld>
+</file>
+
+<file path=ppt/slides/slide16.xml><?xml version="1.0" encoding="utf-8"?>
+<p:sld xmlns:a="http://schemas.openxmlformats.org/drawingml/2006/main" xmlns:r="http://schemas.openxmlformats.org/officeDocument/2006/relationships" xmlns:p="http://schemas.openxmlformats.org/presentationml/2006/main">
+  <p:cSld>
+    <p:spTree>
+      <p:nvGrpSpPr>
+        <p:cNvPr id="1" name=""/>
+        <p:cNvGrpSpPr/>
+        <p:nvPr/>
+      </p:nvGrpSpPr>
+      <p:grpSpPr>
+        <a:xfrm>
+          <a:off x="0" y="0"/>
+          <a:ext cx="0" cy="0"/>
+          <a:chOff x="0" y="0"/>
+          <a:chExt cx="0" cy="0"/>
+        </a:xfrm>
+      </p:grpSpPr>
+      <p:sp>
+        <p:nvSpPr>
+          <p:cNvPr id="2" name="Title 1"/>
+          <p:cNvSpPr>
+            <a:spLocks noGrp="1"/>
+          </p:cNvSpPr>
+          <p:nvPr>
+            <p:ph type="title"/>
+          </p:nvPr>
+        </p:nvSpPr>
+        <p:spPr/>
+        <p:txBody>
+          <a:bodyPr/>
+          <a:lstStyle/>
+          <a:p>
+            <a:r>
+              <a:rPr lang="en-US" dirty="0" smtClean="0"/>
+              <a:t>Control scheme</a:t>
+            </a:r>
+            <a:endParaRPr lang="en-US" dirty="0"/>
+          </a:p>
+        </p:txBody>
+      </p:sp>
+      <p:sp>
+        <p:nvSpPr>
+          <p:cNvPr id="3" name="Content Placeholder 2"/>
+          <p:cNvSpPr>
+            <a:spLocks noGrp="1"/>
+          </p:cNvSpPr>
+          <p:nvPr>
+            <p:ph idx="1"/>
+          </p:nvPr>
+        </p:nvSpPr>
+        <p:spPr/>
+        <p:txBody>
+          <a:bodyPr/>
+          <a:lstStyle/>
+          <a:p>
+            <a:r>
+              <a:rPr lang="en-US" dirty="0" smtClean="0"/>
+              <a:t>Insert diagrams here</a:t>
+            </a:r>
+            <a:endParaRPr lang="en-US" dirty="0"/>
+          </a:p>
+        </p:txBody>
+      </p:sp>
+    </p:spTree>
+    <p:extLst>
+      <p:ext uri="{BB962C8B-B14F-4D97-AF65-F5344CB8AC3E}">
+        <p14:creationId xmlns:p14="http://schemas.microsoft.com/office/powerpoint/2010/main" val="2600624425"/>
+      </p:ext>
+    </p:extLst>
+  </p:cSld>
+  <p:clrMapOvr>
+    <a:masterClrMapping/>
+  </p:clrMapOvr>
+  <p:timing>
+    <p:tnLst>
+      <p:par>
+        <p:cTn id="1" dur="indefinite" restart="never" nodeType="tmRoot"/>
+      </p:par>
+    </p:tnLst>
+  </p:timing>
+</p:sld>
+</file>
+
+<file path=ppt/slides/slide17.xml><?xml version="1.0" encoding="utf-8"?>
+<p:sld xmlns:a="http://schemas.openxmlformats.org/drawingml/2006/main" xmlns:r="http://schemas.openxmlformats.org/officeDocument/2006/relationships" xmlns:p="http://schemas.openxmlformats.org/presentationml/2006/main">
+  <p:cSld>
+    <p:spTree>
+      <p:nvGrpSpPr>
+        <p:cNvPr id="1" name=""/>
+        <p:cNvGrpSpPr/>
+        <p:nvPr/>
+      </p:nvGrpSpPr>
+      <p:grpSpPr>
+        <a:xfrm>
+          <a:off x="0" y="0"/>
+          <a:ext cx="0" cy="0"/>
+          <a:chOff x="0" y="0"/>
+          <a:chExt cx="0" cy="0"/>
+        </a:xfrm>
+      </p:grpSpPr>
+      <p:sp>
+        <p:nvSpPr>
+          <p:cNvPr id="2" name="Title 1"/>
+          <p:cNvSpPr>
+            <a:spLocks noGrp="1"/>
+          </p:cNvSpPr>
+          <p:nvPr>
+            <p:ph type="title"/>
+          </p:nvPr>
+        </p:nvSpPr>
+        <p:spPr/>
+        <p:txBody>
+          <a:bodyPr/>
+          <a:lstStyle/>
+          <a:p>
+            <a:r>
+              <a:rPr lang="en-US" dirty="0" smtClean="0"/>
               <a:t>What’s Next?</a:t>
             </a:r>
             <a:endParaRPr lang="en-US" dirty="0"/>
@@ -13152,7 +13780,6 @@
               <a:rPr lang="en-US" dirty="0" smtClean="0"/>
               <a:t>consider a full leg</a:t>
             </a:r>
-            <a:endParaRPr lang="en-US" dirty="0" smtClean="0"/>
           </a:p>
           <a:p>
             <a:r>
@@ -13200,7 +13827,7 @@
 </p:sld>
 </file>
 
-<file path=ppt/slides/slide15.xml><?xml version="1.0" encoding="utf-8"?>
+<file path=ppt/slides/slide18.xml><?xml version="1.0" encoding="utf-8"?>
 <p:sld xmlns:a="http://schemas.openxmlformats.org/drawingml/2006/main" xmlns:r="http://schemas.openxmlformats.org/officeDocument/2006/relationships" xmlns:p="http://schemas.openxmlformats.org/presentationml/2006/main">
   <p:cSld>
     <p:spTree>
@@ -13523,17 +14150,12 @@
             <a:pPr lvl="1"/>
             <a:r>
               <a:rPr lang="en-US" dirty="0"/>
-              <a:t>Rugged </a:t>
-            </a:r>
-            <a:r>
-              <a:rPr lang="en-US" dirty="0"/>
-              <a:t>t</a:t>
+              <a:t>Rugged t</a:t>
             </a:r>
             <a:r>
               <a:rPr lang="en-US" dirty="0" smtClean="0"/>
               <a:t>errain capability</a:t>
             </a:r>
-            <a:endParaRPr lang="en-US" dirty="0" smtClean="0"/>
           </a:p>
           <a:p>
             <a:r>
@@ -13656,42 +14278,36 @@
               <a:rPr lang="en-US" dirty="0" smtClean="0"/>
               <a:t>Maximum weight of 35 kg</a:t>
             </a:r>
-            <a:endParaRPr lang="en-US" dirty="0" smtClean="0"/>
           </a:p>
           <a:p>
             <a:r>
               <a:rPr lang="en-US" dirty="0" smtClean="0"/>
               <a:t>Top speed of 0.5 m/s</a:t>
             </a:r>
-            <a:endParaRPr lang="en-US" dirty="0" smtClean="0"/>
           </a:p>
           <a:p>
             <a:r>
               <a:rPr lang="en-US" dirty="0" smtClean="0"/>
               <a:t>Implementation of drag gait</a:t>
             </a:r>
-            <a:endParaRPr lang="en-US" dirty="0" smtClean="0"/>
           </a:p>
           <a:p>
             <a:r>
               <a:rPr lang="en-US" dirty="0" smtClean="0"/>
               <a:t>Easily accessible emergency stops</a:t>
             </a:r>
-            <a:endParaRPr lang="en-US" dirty="0" smtClean="0"/>
           </a:p>
           <a:p>
             <a:r>
               <a:rPr lang="en-US" dirty="0" smtClean="0"/>
               <a:t>3 Hour Battery Life</a:t>
             </a:r>
-            <a:endParaRPr lang="en-US" dirty="0" smtClean="0"/>
           </a:p>
           <a:p>
             <a:r>
               <a:rPr lang="en-US" dirty="0" smtClean="0"/>
               <a:t>Onboard batteries and control systems</a:t>
             </a:r>
-            <a:endParaRPr lang="en-US" dirty="0" smtClean="0"/>
           </a:p>
           <a:p>
             <a:r>

</xml_diff>